<commit_message>
Klassendiagramm I und II
</commit_message>
<xml_diff>
--- a/Planung/Präsentation 16.12.pptx
+++ b/Planung/Präsentation 16.12.pptx
@@ -11,6 +11,9 @@
     <p:sldId id="259" r:id="rId5"/>
     <p:sldId id="260" r:id="rId6"/>
     <p:sldId id="261" r:id="rId7"/>
+    <p:sldId id="262" r:id="rId8"/>
+    <p:sldId id="263" r:id="rId9"/>
+    <p:sldId id="264" r:id="rId10"/>
   </p:sldIdLst>
   <p:sldSz cx="12192000" cy="6858000"/>
   <p:notesSz cx="6858000" cy="9144000"/>
@@ -20795,7 +20798,7 @@
             </a:pPr>
             <a:r>
               <a:rPr lang="de-DE" dirty="0" err="1" smtClean="0"/>
-              <a:t>Usecase</a:t>
+              <a:t>Usecases</a:t>
             </a:r>
             <a:r>
               <a:rPr lang="de-DE" dirty="0" smtClean="0"/>
@@ -21184,11 +21187,7 @@
             </a:pPr>
             <a:r>
               <a:rPr lang="de-DE" dirty="0" smtClean="0"/>
-              <a:t>Unternehmen verkaufen </a:t>
-            </a:r>
-            <a:r>
-              <a:rPr lang="de-DE" smtClean="0"/>
-              <a:t>mehrere Produkte</a:t>
+              <a:t>Unternehmen verkaufen mehrere Produkte</a:t>
             </a:r>
             <a:endParaRPr lang="de-DE" dirty="0"/>
           </a:p>
@@ -21307,6 +21306,150 @@
       </p:grpSpPr>
       <p:sp>
         <p:nvSpPr>
+          <p:cNvPr id="4" name="Titel 3"/>
+          <p:cNvSpPr>
+            <a:spLocks noGrp="1"/>
+          </p:cNvSpPr>
+          <p:nvPr>
+            <p:ph type="title"/>
+          </p:nvPr>
+        </p:nvSpPr>
+        <p:spPr/>
+        <p:txBody>
+          <a:bodyPr/>
+          <a:lstStyle/>
+          <a:p>
+            <a:r>
+              <a:rPr lang="de-DE" dirty="0" err="1" smtClean="0"/>
+              <a:t>UsecASes</a:t>
+            </a:r>
+            <a:endParaRPr lang="de-DE" dirty="0"/>
+          </a:p>
+        </p:txBody>
+      </p:sp>
+      <p:sp>
+        <p:nvSpPr>
+          <p:cNvPr id="5" name="Textplatzhalter 4"/>
+          <p:cNvSpPr>
+            <a:spLocks noGrp="1"/>
+          </p:cNvSpPr>
+          <p:nvPr>
+            <p:ph type="body" idx="1"/>
+          </p:nvPr>
+        </p:nvSpPr>
+        <p:spPr/>
+        <p:txBody>
+          <a:bodyPr/>
+          <a:lstStyle/>
+          <a:p>
+            <a:endParaRPr lang="de-DE"/>
+          </a:p>
+        </p:txBody>
+      </p:sp>
+    </p:spTree>
+    <p:extLst>
+      <p:ext uri="{BB962C8B-B14F-4D97-AF65-F5344CB8AC3E}">
+        <p14:creationId xmlns:p14="http://schemas.microsoft.com/office/powerpoint/2010/main" val="212017160"/>
+      </p:ext>
+    </p:extLst>
+  </p:cSld>
+  <p:clrMapOvr>
+    <a:masterClrMapping/>
+  </p:clrMapOvr>
+</p:sld>
+</file>
+
+<file path=ppt/slides/slide7.xml><?xml version="1.0" encoding="utf-8"?>
+<p:sld xmlns:a="http://schemas.openxmlformats.org/drawingml/2006/main" xmlns:r="http://schemas.openxmlformats.org/officeDocument/2006/relationships" xmlns:p="http://schemas.openxmlformats.org/presentationml/2006/main">
+  <p:cSld>
+    <p:spTree>
+      <p:nvGrpSpPr>
+        <p:cNvPr id="1" name=""/>
+        <p:cNvGrpSpPr/>
+        <p:nvPr/>
+      </p:nvGrpSpPr>
+      <p:grpSpPr>
+        <a:xfrm>
+          <a:off x="0" y="0"/>
+          <a:ext cx="0" cy="0"/>
+          <a:chOff x="0" y="0"/>
+          <a:chExt cx="0" cy="0"/>
+        </a:xfrm>
+      </p:grpSpPr>
+      <p:sp>
+        <p:nvSpPr>
+          <p:cNvPr id="6" name="Titel 5"/>
+          <p:cNvSpPr>
+            <a:spLocks noGrp="1"/>
+          </p:cNvSpPr>
+          <p:nvPr>
+            <p:ph type="title"/>
+          </p:nvPr>
+        </p:nvSpPr>
+        <p:spPr/>
+        <p:txBody>
+          <a:bodyPr/>
+          <a:lstStyle/>
+          <a:p>
+            <a:r>
+              <a:rPr lang="de-DE" dirty="0" err="1" smtClean="0"/>
+              <a:t>KlassenDiagramme</a:t>
+            </a:r>
+            <a:endParaRPr lang="de-DE" dirty="0"/>
+          </a:p>
+        </p:txBody>
+      </p:sp>
+      <p:sp>
+        <p:nvSpPr>
+          <p:cNvPr id="7" name="Textplatzhalter 6"/>
+          <p:cNvSpPr>
+            <a:spLocks noGrp="1"/>
+          </p:cNvSpPr>
+          <p:nvPr>
+            <p:ph type="body" idx="1"/>
+          </p:nvPr>
+        </p:nvSpPr>
+        <p:spPr/>
+        <p:txBody>
+          <a:bodyPr/>
+          <a:lstStyle/>
+          <a:p>
+            <a:endParaRPr lang="de-DE"/>
+          </a:p>
+        </p:txBody>
+      </p:sp>
+    </p:spTree>
+    <p:extLst>
+      <p:ext uri="{BB962C8B-B14F-4D97-AF65-F5344CB8AC3E}">
+        <p14:creationId xmlns:p14="http://schemas.microsoft.com/office/powerpoint/2010/main" val="648825351"/>
+      </p:ext>
+    </p:extLst>
+  </p:cSld>
+  <p:clrMapOvr>
+    <a:masterClrMapping/>
+  </p:clrMapOvr>
+</p:sld>
+</file>
+
+<file path=ppt/slides/slide8.xml><?xml version="1.0" encoding="utf-8"?>
+<p:sld xmlns:a="http://schemas.openxmlformats.org/drawingml/2006/main" xmlns:r="http://schemas.openxmlformats.org/officeDocument/2006/relationships" xmlns:p="http://schemas.openxmlformats.org/presentationml/2006/main">
+  <p:cSld>
+    <p:spTree>
+      <p:nvGrpSpPr>
+        <p:cNvPr id="1" name=""/>
+        <p:cNvGrpSpPr/>
+        <p:nvPr/>
+      </p:nvGrpSpPr>
+      <p:grpSpPr>
+        <a:xfrm>
+          <a:off x="0" y="0"/>
+          <a:ext cx="0" cy="0"/>
+          <a:chOff x="0" y="0"/>
+          <a:chExt cx="0" cy="0"/>
+        </a:xfrm>
+      </p:grpSpPr>
+      <p:sp>
+        <p:nvSpPr>
           <p:cNvPr id="2" name="Titel 1"/>
           <p:cNvSpPr>
             <a:spLocks noGrp="1"/>
@@ -21320,13 +21463,89 @@
           <a:bodyPr/>
           <a:lstStyle/>
           <a:p>
+            <a:r>
+              <a:rPr lang="de-DE" dirty="0" smtClean="0"/>
+              <a:t>Unit Tests</a:t>
+            </a:r>
+            <a:endParaRPr lang="de-DE" dirty="0"/>
+          </a:p>
+        </p:txBody>
+      </p:sp>
+      <p:sp>
+        <p:nvSpPr>
+          <p:cNvPr id="3" name="Textplatzhalter 2"/>
+          <p:cNvSpPr>
+            <a:spLocks noGrp="1"/>
+          </p:cNvSpPr>
+          <p:nvPr>
+            <p:ph type="body" idx="1"/>
+          </p:nvPr>
+        </p:nvSpPr>
+        <p:spPr/>
+        <p:txBody>
+          <a:bodyPr/>
+          <a:lstStyle/>
+          <a:p>
+            <a:endParaRPr lang="de-DE"/>
+          </a:p>
+        </p:txBody>
+      </p:sp>
+    </p:spTree>
+    <p:extLst>
+      <p:ext uri="{BB962C8B-B14F-4D97-AF65-F5344CB8AC3E}">
+        <p14:creationId xmlns:p14="http://schemas.microsoft.com/office/powerpoint/2010/main" val="3738212162"/>
+      </p:ext>
+    </p:extLst>
+  </p:cSld>
+  <p:clrMapOvr>
+    <a:masterClrMapping/>
+  </p:clrMapOvr>
+</p:sld>
+</file>
+
+<file path=ppt/slides/slide9.xml><?xml version="1.0" encoding="utf-8"?>
+<p:sld xmlns:a="http://schemas.openxmlformats.org/drawingml/2006/main" xmlns:r="http://schemas.openxmlformats.org/officeDocument/2006/relationships" xmlns:p="http://schemas.openxmlformats.org/presentationml/2006/main">
+  <p:cSld>
+    <p:spTree>
+      <p:nvGrpSpPr>
+        <p:cNvPr id="1" name=""/>
+        <p:cNvGrpSpPr/>
+        <p:nvPr/>
+      </p:nvGrpSpPr>
+      <p:grpSpPr>
+        <a:xfrm>
+          <a:off x="0" y="0"/>
+          <a:ext cx="0" cy="0"/>
+          <a:chOff x="0" y="0"/>
+          <a:chExt cx="0" cy="0"/>
+        </a:xfrm>
+      </p:grpSpPr>
+      <p:sp>
+        <p:nvSpPr>
+          <p:cNvPr id="4" name="Titel 3"/>
+          <p:cNvSpPr>
+            <a:spLocks noGrp="1"/>
+          </p:cNvSpPr>
+          <p:nvPr>
+            <p:ph type="title"/>
+          </p:nvPr>
+        </p:nvSpPr>
+        <p:spPr/>
+        <p:txBody>
+          <a:bodyPr/>
+          <a:lstStyle/>
+          <a:p>
+            <a:r>
+              <a:rPr lang="de-DE" smtClean="0"/>
+              <a:t>Seminararbeit</a:t>
+            </a:r>
             <a:endParaRPr lang="de-DE"/>
           </a:p>
         </p:txBody>
       </p:sp>
       <p:sp>
         <p:nvSpPr>
-          <p:cNvPr id="3" name="Inhaltsplatzhalter 2"/>
+          <p:cNvPr id="5" name="Inhaltsplatzhalter 4"/>
           <p:cNvSpPr>
             <a:spLocks noGrp="1"/>
           </p:cNvSpPr>
@@ -21346,7 +21565,7 @@
     </p:spTree>
     <p:extLst>
       <p:ext uri="{BB962C8B-B14F-4D97-AF65-F5344CB8AC3E}">
-        <p14:creationId xmlns:p14="http://schemas.microsoft.com/office/powerpoint/2010/main" val="212017160"/>
+        <p14:creationId xmlns:p14="http://schemas.microsoft.com/office/powerpoint/2010/main" val="97129058"/>
       </p:ext>
     </p:extLst>
   </p:cSld>

</xml_diff>